<commit_message>
Gellért: fork frissítés (2016.07.28.)
</commit_message>
<xml_diff>
--- a/public_html/letolt/w3_suli_gellert.pptx
+++ b/public_html/letolt/w3_suli_gellert.pptx
@@ -5,7 +5,7 @@
     <p:sldMasterId id="2147483648" r:id="rId1"/>
   </p:sldMasterIdLst>
   <p:notesMasterIdLst>
-    <p:notesMasterId r:id="rId25"/>
+    <p:notesMasterId r:id="rId26"/>
   </p:notesMasterIdLst>
   <p:sldIdLst>
     <p:sldId id="258" r:id="rId2"/>
@@ -31,6 +31,7 @@
     <p:sldId id="268" r:id="rId22"/>
     <p:sldId id="275" r:id="rId23"/>
     <p:sldId id="279" r:id="rId24"/>
+    <p:sldId id="282" r:id="rId25"/>
   </p:sldIdLst>
   <p:sldSz cx="9144000" cy="6858000" type="screen4x3"/>
   <p:notesSz cx="6858000" cy="9144000"/>
@@ -215,7 +216,7 @@
             <a:fld id="{1F41982A-C32C-41AE-BCB4-ED7334530670}" type="datetimeFigureOut">
               <a:rPr lang="en-GB" smtClean="0"/>
               <a:pPr/>
-              <a:t>26/03/2016</a:t>
+              <a:t>04/04/2016</a:t>
             </a:fld>
             <a:endParaRPr lang="en-GB"/>
           </a:p>
@@ -991,7 +992,7 @@
             <a:fld id="{71635872-D2C1-45D4-AD12-742E72A2F060}" type="datetimeFigureOut">
               <a:rPr lang="en-GB" smtClean="0"/>
               <a:pPr/>
-              <a:t>26/03/2016</a:t>
+              <a:t>04/04/2016</a:t>
             </a:fld>
             <a:endParaRPr lang="en-GB"/>
           </a:p>
@@ -1158,7 +1159,7 @@
             <a:fld id="{71635872-D2C1-45D4-AD12-742E72A2F060}" type="datetimeFigureOut">
               <a:rPr lang="en-GB" smtClean="0"/>
               <a:pPr/>
-              <a:t>26/03/2016</a:t>
+              <a:t>04/04/2016</a:t>
             </a:fld>
             <a:endParaRPr lang="en-GB"/>
           </a:p>
@@ -1335,7 +1336,7 @@
             <a:fld id="{71635872-D2C1-45D4-AD12-742E72A2F060}" type="datetimeFigureOut">
               <a:rPr lang="en-GB" smtClean="0"/>
               <a:pPr/>
-              <a:t>26/03/2016</a:t>
+              <a:t>04/04/2016</a:t>
             </a:fld>
             <a:endParaRPr lang="en-GB"/>
           </a:p>
@@ -1502,7 +1503,7 @@
             <a:fld id="{71635872-D2C1-45D4-AD12-742E72A2F060}" type="datetimeFigureOut">
               <a:rPr lang="en-GB" smtClean="0"/>
               <a:pPr/>
-              <a:t>26/03/2016</a:t>
+              <a:t>04/04/2016</a:t>
             </a:fld>
             <a:endParaRPr lang="en-GB"/>
           </a:p>
@@ -1745,7 +1746,7 @@
             <a:fld id="{71635872-D2C1-45D4-AD12-742E72A2F060}" type="datetimeFigureOut">
               <a:rPr lang="en-GB" smtClean="0"/>
               <a:pPr/>
-              <a:t>26/03/2016</a:t>
+              <a:t>04/04/2016</a:t>
             </a:fld>
             <a:endParaRPr lang="en-GB"/>
           </a:p>
@@ -2030,7 +2031,7 @@
             <a:fld id="{71635872-D2C1-45D4-AD12-742E72A2F060}" type="datetimeFigureOut">
               <a:rPr lang="en-GB" smtClean="0"/>
               <a:pPr/>
-              <a:t>26/03/2016</a:t>
+              <a:t>04/04/2016</a:t>
             </a:fld>
             <a:endParaRPr lang="en-GB"/>
           </a:p>
@@ -2449,7 +2450,7 @@
             <a:fld id="{71635872-D2C1-45D4-AD12-742E72A2F060}" type="datetimeFigureOut">
               <a:rPr lang="en-GB" smtClean="0"/>
               <a:pPr/>
-              <a:t>26/03/2016</a:t>
+              <a:t>04/04/2016</a:t>
             </a:fld>
             <a:endParaRPr lang="en-GB"/>
           </a:p>
@@ -2564,7 +2565,7 @@
             <a:fld id="{71635872-D2C1-45D4-AD12-742E72A2F060}" type="datetimeFigureOut">
               <a:rPr lang="en-GB" smtClean="0"/>
               <a:pPr/>
-              <a:t>26/03/2016</a:t>
+              <a:t>04/04/2016</a:t>
             </a:fld>
             <a:endParaRPr lang="en-GB"/>
           </a:p>
@@ -2656,7 +2657,7 @@
             <a:fld id="{71635872-D2C1-45D4-AD12-742E72A2F060}" type="datetimeFigureOut">
               <a:rPr lang="en-GB" smtClean="0"/>
               <a:pPr/>
-              <a:t>26/03/2016</a:t>
+              <a:t>04/04/2016</a:t>
             </a:fld>
             <a:endParaRPr lang="en-GB"/>
           </a:p>
@@ -2930,7 +2931,7 @@
             <a:fld id="{71635872-D2C1-45D4-AD12-742E72A2F060}" type="datetimeFigureOut">
               <a:rPr lang="en-GB" smtClean="0"/>
               <a:pPr/>
-              <a:t>26/03/2016</a:t>
+              <a:t>04/04/2016</a:t>
             </a:fld>
             <a:endParaRPr lang="en-GB"/>
           </a:p>
@@ -3180,7 +3181,7 @@
             <a:fld id="{71635872-D2C1-45D4-AD12-742E72A2F060}" type="datetimeFigureOut">
               <a:rPr lang="en-GB" smtClean="0"/>
               <a:pPr/>
-              <a:t>26/03/2016</a:t>
+              <a:t>04/04/2016</a:t>
             </a:fld>
             <a:endParaRPr lang="en-GB"/>
           </a:p>
@@ -3414,7 +3415,7 @@
             <a:fld id="{71635872-D2C1-45D4-AD12-742E72A2F060}" type="datetimeFigureOut">
               <a:rPr lang="en-GB" smtClean="0"/>
               <a:pPr/>
-              <a:t>26/03/2016</a:t>
+              <a:t>04/04/2016</a:t>
             </a:fld>
             <a:endParaRPr lang="en-GB"/>
           </a:p>
@@ -8515,7 +8516,7 @@
                 <a:cs typeface="Arabic Typesetting" pitchFamily="66" charset="-78"/>
                 <a:hlinkClick r:id="rId2"/>
               </a:rPr>
-              <a:t>www.egressy.info/w3suli</a:t>
+              <a:t>www.w3suli.hu/</a:t>
             </a:r>
             <a:endParaRPr lang="hu-HU" sz="3500" dirty="0" smtClean="0">
               <a:latin typeface="Arabic Typesetting" pitchFamily="66" charset="-78"/>
@@ -8572,6 +8573,147 @@
           </a:p>
         </p:txBody>
       </p:sp>
+    </p:spTree>
+  </p:cSld>
+  <p:clrMapOvr>
+    <a:masterClrMapping/>
+  </p:clrMapOvr>
+  <p:timing>
+    <p:tnLst>
+      <p:par>
+        <p:cTn id="1" dur="indefinite" restart="never" nodeType="tmRoot"/>
+      </p:par>
+    </p:tnLst>
+  </p:timing>
+</p:sld>
+</file>
+
+<file path=ppt/slides/slide24.xml><?xml version="1.0" encoding="utf-8"?>
+<p:sld xmlns:a="http://schemas.openxmlformats.org/drawingml/2006/main" xmlns:r="http://schemas.openxmlformats.org/officeDocument/2006/relationships" xmlns:p="http://schemas.openxmlformats.org/presentationml/2006/main">
+  <p:cSld>
+    <p:spTree>
+      <p:nvGrpSpPr>
+        <p:cNvPr id="1" name=""/>
+        <p:cNvGrpSpPr/>
+        <p:nvPr/>
+      </p:nvGrpSpPr>
+      <p:grpSpPr>
+        <a:xfrm>
+          <a:off x="0" y="0"/>
+          <a:ext cx="0" cy="0"/>
+          <a:chOff x="0" y="0"/>
+          <a:chExt cx="0" cy="0"/>
+        </a:xfrm>
+      </p:grpSpPr>
+      <p:sp>
+        <p:nvSpPr>
+          <p:cNvPr id="2" name="Title 1"/>
+          <p:cNvSpPr>
+            <a:spLocks noGrp="1"/>
+          </p:cNvSpPr>
+          <p:nvPr>
+            <p:ph type="title"/>
+          </p:nvPr>
+        </p:nvSpPr>
+        <p:spPr/>
+        <p:txBody>
+          <a:bodyPr>
+            <a:normAutofit/>
+          </a:bodyPr>
+          <a:lstStyle/>
+          <a:p>
+            <a:r>
+              <a:rPr lang="hu-HU" sz="6000" b="1" dirty="0" smtClean="0">
+                <a:latin typeface="Arabic Typesetting" pitchFamily="66" charset="-78"/>
+                <a:cs typeface="Arabic Typesetting" pitchFamily="66" charset="-78"/>
+              </a:rPr>
+              <a:t>Együttműködő partnereink</a:t>
+            </a:r>
+            <a:endParaRPr lang="en-GB" sz="6000" b="1" dirty="0">
+              <a:latin typeface="Arabic Typesetting" pitchFamily="66" charset="-78"/>
+              <a:cs typeface="Arabic Typesetting" pitchFamily="66" charset="-78"/>
+            </a:endParaRPr>
+          </a:p>
+        </p:txBody>
+      </p:sp>
+      <p:pic>
+        <p:nvPicPr>
+          <p:cNvPr id="1026" name="Picture 2" descr="C:\Users\Gelcsi\Desktop\gdt_logo.png"/>
+          <p:cNvPicPr>
+            <a:picLocks noChangeAspect="1" noChangeArrowheads="1"/>
+          </p:cNvPicPr>
+          <p:nvPr/>
+        </p:nvPicPr>
+        <p:blipFill>
+          <a:blip r:embed="rId2" cstate="print"/>
+          <a:srcRect l="-2128" r="-2128" b="-5820"/>
+          <a:stretch>
+            <a:fillRect/>
+          </a:stretch>
+        </p:blipFill>
+        <p:spPr bwMode="auto">
+          <a:xfrm>
+            <a:off x="2699792" y="3429000"/>
+            <a:ext cx="3528392" cy="2736304"/>
+          </a:xfrm>
+          <a:prstGeom prst="rect">
+            <a:avLst/>
+          </a:prstGeom>
+          <a:ln w="38100" cap="sq">
+            <a:solidFill>
+              <a:srgbClr val="000000"/>
+            </a:solidFill>
+            <a:prstDash val="solid"/>
+            <a:miter lim="800000"/>
+          </a:ln>
+          <a:effectLst>
+            <a:outerShdw blurRad="50800" dist="38100" dir="2700000" algn="tl" rotWithShape="0">
+              <a:srgbClr val="000000">
+                <a:alpha val="43000"/>
+              </a:srgbClr>
+            </a:outerShdw>
+          </a:effectLst>
+        </p:spPr>
+      </p:pic>
+      <p:pic>
+        <p:nvPicPr>
+          <p:cNvPr id="1027" name="Picture 3" descr="C:\Users\Gelcsi\Desktop\isze_logo.png"/>
+          <p:cNvPicPr>
+            <a:picLocks noChangeAspect="1" noChangeArrowheads="1"/>
+          </p:cNvPicPr>
+          <p:nvPr/>
+        </p:nvPicPr>
+        <p:blipFill>
+          <a:blip r:embed="rId3" cstate="print"/>
+          <a:srcRect/>
+          <a:stretch>
+            <a:fillRect/>
+          </a:stretch>
+        </p:blipFill>
+        <p:spPr bwMode="auto">
+          <a:xfrm>
+            <a:off x="2051720" y="1844824"/>
+            <a:ext cx="4896544" cy="1231835"/>
+          </a:xfrm>
+          <a:prstGeom prst="rect">
+            <a:avLst/>
+          </a:prstGeom>
+          <a:ln w="38100" cap="sq">
+            <a:solidFill>
+              <a:srgbClr val="000000"/>
+            </a:solidFill>
+            <a:prstDash val="solid"/>
+            <a:miter lim="800000"/>
+          </a:ln>
+          <a:effectLst>
+            <a:outerShdw blurRad="50800" dist="38100" dir="2700000" algn="tl" rotWithShape="0">
+              <a:srgbClr val="000000">
+                <a:alpha val="43000"/>
+              </a:srgbClr>
+            </a:outerShdw>
+          </a:effectLst>
+        </p:spPr>
+      </p:pic>
     </p:spTree>
   </p:cSld>
   <p:clrMapOvr>
@@ -8999,14 +9141,23 @@
                 <a:latin typeface="Arabic Typesetting" pitchFamily="66" charset="-78"/>
                 <a:cs typeface="Arabic Typesetting" pitchFamily="66" charset="-78"/>
               </a:rPr>
-              <a:t>Gál Tamás, Sallai </a:t>
+              <a:t>Gál Tamás, Sallai András</a:t>
+            </a:r>
+          </a:p>
+          <a:p>
+            <a:r>
+              <a:rPr lang="hu-HU" b="1" dirty="0" smtClean="0">
+                <a:latin typeface="Arabic Typesetting" pitchFamily="66" charset="-78"/>
+                <a:cs typeface="Arabic Typesetting" pitchFamily="66" charset="-78"/>
+              </a:rPr>
+              <a:t>Programkód: </a:t>
             </a:r>
             <a:r>
               <a:rPr lang="hu-HU" sz="3000" dirty="0" smtClean="0">
                 <a:latin typeface="Arabic Typesetting" pitchFamily="66" charset="-78"/>
                 <a:cs typeface="Arabic Typesetting" pitchFamily="66" charset="-78"/>
               </a:rPr>
-              <a:t>András</a:t>
+              <a:t>Bárczi Dávid, Guti Patrik, Szabó Máté, Szép Balázs, Tóth-Kovács Gellért, Wigmond Ádám</a:t>
             </a:r>
           </a:p>
           <a:p>
@@ -9015,126 +9166,15 @@
                 <a:latin typeface="Arabic Typesetting" pitchFamily="66" charset="-78"/>
                 <a:cs typeface="Arabic Typesetting" pitchFamily="66" charset="-78"/>
               </a:rPr>
-              <a:t>Programkód: </a:t>
+              <a:t>Design és tesztelés: </a:t>
             </a:r>
             <a:r>
               <a:rPr lang="hu-HU" sz="3000" dirty="0" smtClean="0">
                 <a:latin typeface="Arabic Typesetting" pitchFamily="66" charset="-78"/>
                 <a:cs typeface="Arabic Typesetting" pitchFamily="66" charset="-78"/>
               </a:rPr>
-              <a:t>Bárczi Dávid, </a:t>
-            </a:r>
-            <a:r>
-              <a:rPr lang="hu-HU" sz="3000" dirty="0" smtClean="0">
-                <a:latin typeface="Arabic Typesetting" pitchFamily="66" charset="-78"/>
-                <a:cs typeface="Arabic Typesetting" pitchFamily="66" charset="-78"/>
-              </a:rPr>
-              <a:t>Guti Patrik, </a:t>
-            </a:r>
-            <a:r>
-              <a:rPr lang="hu-HU" sz="3000" dirty="0" smtClean="0">
-                <a:latin typeface="Arabic Typesetting" pitchFamily="66" charset="-78"/>
-                <a:cs typeface="Arabic Typesetting" pitchFamily="66" charset="-78"/>
-              </a:rPr>
-              <a:t>Szabó Máté, </a:t>
-            </a:r>
-            <a:r>
-              <a:rPr lang="hu-HU" sz="3000" dirty="0" smtClean="0">
-                <a:latin typeface="Arabic Typesetting" pitchFamily="66" charset="-78"/>
-                <a:cs typeface="Arabic Typesetting" pitchFamily="66" charset="-78"/>
-              </a:rPr>
-              <a:t>Szép Balázs, Tóth-Kovács Gellért, Wigmond Ádám</a:t>
-            </a:r>
-          </a:p>
-          <a:p>
-            <a:r>
-              <a:rPr lang="hu-HU" b="1" dirty="0" smtClean="0">
-                <a:latin typeface="Arabic Typesetting" pitchFamily="66" charset="-78"/>
-                <a:cs typeface="Arabic Typesetting" pitchFamily="66" charset="-78"/>
-              </a:rPr>
-              <a:t>Design és tesztelés: </a:t>
-            </a:r>
-            <a:r>
-              <a:rPr lang="hu-HU" sz="3000" dirty="0" smtClean="0">
-                <a:latin typeface="Arabic Typesetting" pitchFamily="66" charset="-78"/>
-                <a:cs typeface="Arabic Typesetting" pitchFamily="66" charset="-78"/>
-              </a:rPr>
-              <a:t>Bárczi Dávid, </a:t>
-            </a:r>
-            <a:r>
-              <a:rPr lang="hu-HU" sz="3000" dirty="0" smtClean="0">
-                <a:latin typeface="Arabic Typesetting" pitchFamily="66" charset="-78"/>
-                <a:cs typeface="Arabic Typesetting" pitchFamily="66" charset="-78"/>
-              </a:rPr>
-              <a:t>Beschenbacher Kornél, </a:t>
-            </a:r>
-            <a:r>
-              <a:rPr lang="hu-HU" sz="3000" dirty="0" smtClean="0">
-                <a:latin typeface="Arabic Typesetting" pitchFamily="66" charset="-78"/>
-                <a:cs typeface="Arabic Typesetting" pitchFamily="66" charset="-78"/>
-              </a:rPr>
-              <a:t>Guti Patrik, </a:t>
-            </a:r>
-            <a:r>
-              <a:rPr lang="hu-HU" sz="3000" dirty="0" smtClean="0">
-                <a:latin typeface="Arabic Typesetting" pitchFamily="66" charset="-78"/>
-                <a:cs typeface="Arabic Typesetting" pitchFamily="66" charset="-78"/>
-              </a:rPr>
-              <a:t>Nagy Gábor, </a:t>
-            </a:r>
-            <a:r>
-              <a:rPr lang="hu-HU" sz="3000" dirty="0" smtClean="0">
-                <a:latin typeface="Arabic Typesetting" pitchFamily="66" charset="-78"/>
-                <a:cs typeface="Arabic Typesetting" pitchFamily="66" charset="-78"/>
-              </a:rPr>
-              <a:t>Nagy Tamás, Pallagi Dániel, </a:t>
-            </a:r>
-            <a:r>
-              <a:rPr lang="hu-HU" sz="3000" dirty="0" smtClean="0">
-                <a:latin typeface="Arabic Typesetting" pitchFamily="66" charset="-78"/>
-                <a:cs typeface="Arabic Typesetting" pitchFamily="66" charset="-78"/>
-              </a:rPr>
-              <a:t>Parma Robin, </a:t>
-            </a:r>
-            <a:r>
-              <a:rPr lang="hu-HU" sz="3000" dirty="0" smtClean="0">
-                <a:latin typeface="Arabic Typesetting" pitchFamily="66" charset="-78"/>
-                <a:cs typeface="Arabic Typesetting" pitchFamily="66" charset="-78"/>
-              </a:rPr>
-              <a:t>Répás Benedek, </a:t>
-            </a:r>
-            <a:r>
-              <a:rPr lang="hu-HU" sz="3000" dirty="0" smtClean="0">
-                <a:latin typeface="Arabic Typesetting" pitchFamily="66" charset="-78"/>
-                <a:cs typeface="Arabic Typesetting" pitchFamily="66" charset="-78"/>
-              </a:rPr>
-              <a:t>Salamon Péter, </a:t>
-            </a:r>
-            <a:r>
-              <a:rPr lang="hu-HU" sz="3000" dirty="0" smtClean="0">
-                <a:latin typeface="Arabic Typesetting" pitchFamily="66" charset="-78"/>
-                <a:cs typeface="Arabic Typesetting" pitchFamily="66" charset="-78"/>
-              </a:rPr>
-              <a:t>Szabó Máté, </a:t>
-            </a:r>
-            <a:r>
-              <a:rPr lang="hu-HU" sz="3000" dirty="0" smtClean="0">
-                <a:latin typeface="Arabic Typesetting" pitchFamily="66" charset="-78"/>
-                <a:cs typeface="Arabic Typesetting" pitchFamily="66" charset="-78"/>
-              </a:rPr>
-              <a:t>Szilágyi István, Varga Krisztián, </a:t>
-            </a:r>
-            <a:r>
-              <a:rPr lang="hu-HU" sz="3000" dirty="0" smtClean="0">
-                <a:latin typeface="Arabic Typesetting" pitchFamily="66" charset="-78"/>
-                <a:cs typeface="Arabic Typesetting" pitchFamily="66" charset="-78"/>
-              </a:rPr>
-              <a:t>Wimetal Noémi</a:t>
-            </a:r>
-            <a:endParaRPr lang="hu-HU" sz="3000" dirty="0" smtClean="0">
-              <a:latin typeface="Arabic Typesetting" pitchFamily="66" charset="-78"/>
-              <a:cs typeface="Arabic Typesetting" pitchFamily="66" charset="-78"/>
-            </a:endParaRPr>
+              <a:t>Bárczi Dávid, Beschenbacher Kornél, Guti Patrik, Nagy Gábor, Nagy Tamás, Pallagi Dániel, Parma Robin, Répás Benedek, Salamon Péter, Szabó Máté, Szilágyi István, Varga Krisztián, Wimetal Noémi</a:t>
+            </a:r>
           </a:p>
           <a:p>
             <a:r>

</xml_diff>